<commit_message>
linear algebra and FT 사진 수정
</commit_message>
<xml_diff>
--- a/pics/2020-11-08-linear_algebra_and_Fourier_transform/pics.pptx
+++ b/pics/2020-11-08-linear_algebra_and_Fourier_transform/pics.pptx
@@ -105,6 +105,22 @@
       </a:defRPr>
     </a:lvl9pPr>
   </p:defaultTextStyle>
+  <p:extLst>
+    <p:ext uri="{EFAFB233-063F-42B5-8137-9DF3F51BA10A}">
+      <p15:sldGuideLst xmlns:p15="http://schemas.microsoft.com/office/powerpoint/2012/main">
+        <p15:guide id="1" orient="horz" pos="2160">
+          <p15:clr>
+            <a:srgbClr val="A4A3A4"/>
+          </p15:clr>
+        </p15:guide>
+        <p15:guide id="2" pos="2880">
+          <p15:clr>
+            <a:srgbClr val="A4A3A4"/>
+          </p15:clr>
+        </p15:guide>
+      </p15:sldGuideLst>
+    </p:ext>
+  </p:extLst>
 </p:presentation>
 </file>
 
@@ -146,10 +162,9 @@
           <a:lstStyle/>
           <a:p>
             <a:r>
-              <a:rPr lang="ko-KR" altLang="en-US" smtClean="0"/>
+              <a:rPr lang="ko-KR" altLang="en-US"/>
               <a:t>마스터 제목 스타일 편집</a:t>
             </a:r>
-            <a:endParaRPr lang="ko-KR" altLang="en-US"/>
           </a:p>
         </p:txBody>
       </p:sp>
@@ -265,10 +280,9 @@
           </a:lstStyle>
           <a:p>
             <a:r>
-              <a:rPr lang="ko-KR" altLang="en-US" smtClean="0"/>
+              <a:rPr lang="ko-KR" altLang="en-US"/>
               <a:t>마스터 부제목 스타일 편집</a:t>
             </a:r>
-            <a:endParaRPr lang="ko-KR" altLang="en-US"/>
           </a:p>
         </p:txBody>
       </p:sp>
@@ -289,7 +303,7 @@
           <a:p>
             <a:fld id="{FB30EDBD-1C2D-4C1E-B459-B60219FAB484}" type="datetimeFigureOut">
               <a:rPr lang="ko-KR" altLang="en-US" smtClean="0"/>
-              <a:t>2020-11-09</a:t>
+              <a:t>2021-03-27</a:t>
             </a:fld>
             <a:endParaRPr lang="ko-KR" altLang="en-US"/>
           </a:p>
@@ -378,10 +392,9 @@
           <a:lstStyle/>
           <a:p>
             <a:r>
-              <a:rPr lang="ko-KR" altLang="en-US" smtClean="0"/>
+              <a:rPr lang="ko-KR" altLang="en-US"/>
               <a:t>마스터 제목 스타일 편집</a:t>
             </a:r>
-            <a:endParaRPr lang="ko-KR" altLang="en-US"/>
           </a:p>
         </p:txBody>
       </p:sp>
@@ -402,38 +415,37 @@
           <a:p>
             <a:pPr lvl="0"/>
             <a:r>
-              <a:rPr lang="ko-KR" altLang="en-US" smtClean="0"/>
+              <a:rPr lang="ko-KR" altLang="en-US"/>
               <a:t>마스터 텍스트 스타일을 편집합니다</a:t>
             </a:r>
           </a:p>
           <a:p>
             <a:pPr lvl="1"/>
             <a:r>
-              <a:rPr lang="ko-KR" altLang="en-US" smtClean="0"/>
+              <a:rPr lang="ko-KR" altLang="en-US"/>
               <a:t>둘째 수준</a:t>
             </a:r>
           </a:p>
           <a:p>
             <a:pPr lvl="2"/>
             <a:r>
-              <a:rPr lang="ko-KR" altLang="en-US" smtClean="0"/>
+              <a:rPr lang="ko-KR" altLang="en-US"/>
               <a:t>셋째 수준</a:t>
             </a:r>
           </a:p>
           <a:p>
             <a:pPr lvl="3"/>
             <a:r>
-              <a:rPr lang="ko-KR" altLang="en-US" smtClean="0"/>
+              <a:rPr lang="ko-KR" altLang="en-US"/>
               <a:t>넷째 수준</a:t>
             </a:r>
           </a:p>
           <a:p>
             <a:pPr lvl="4"/>
             <a:r>
-              <a:rPr lang="ko-KR" altLang="en-US" smtClean="0"/>
+              <a:rPr lang="ko-KR" altLang="en-US"/>
               <a:t>다섯째 수준</a:t>
             </a:r>
-            <a:endParaRPr lang="ko-KR" altLang="en-US"/>
           </a:p>
         </p:txBody>
       </p:sp>
@@ -454,7 +466,7 @@
           <a:p>
             <a:fld id="{FB30EDBD-1C2D-4C1E-B459-B60219FAB484}" type="datetimeFigureOut">
               <a:rPr lang="ko-KR" altLang="en-US" smtClean="0"/>
-              <a:t>2020-11-09</a:t>
+              <a:t>2021-03-27</a:t>
             </a:fld>
             <a:endParaRPr lang="ko-KR" altLang="en-US"/>
           </a:p>
@@ -548,10 +560,9 @@
           <a:lstStyle/>
           <a:p>
             <a:r>
-              <a:rPr lang="ko-KR" altLang="en-US" smtClean="0"/>
+              <a:rPr lang="ko-KR" altLang="en-US"/>
               <a:t>마스터 제목 스타일 편집</a:t>
             </a:r>
-            <a:endParaRPr lang="ko-KR" altLang="en-US"/>
           </a:p>
         </p:txBody>
       </p:sp>
@@ -577,38 +588,37 @@
           <a:p>
             <a:pPr lvl="0"/>
             <a:r>
-              <a:rPr lang="ko-KR" altLang="en-US" smtClean="0"/>
+              <a:rPr lang="ko-KR" altLang="en-US"/>
               <a:t>마스터 텍스트 스타일을 편집합니다</a:t>
             </a:r>
           </a:p>
           <a:p>
             <a:pPr lvl="1"/>
             <a:r>
-              <a:rPr lang="ko-KR" altLang="en-US" smtClean="0"/>
+              <a:rPr lang="ko-KR" altLang="en-US"/>
               <a:t>둘째 수준</a:t>
             </a:r>
           </a:p>
           <a:p>
             <a:pPr lvl="2"/>
             <a:r>
-              <a:rPr lang="ko-KR" altLang="en-US" smtClean="0"/>
+              <a:rPr lang="ko-KR" altLang="en-US"/>
               <a:t>셋째 수준</a:t>
             </a:r>
           </a:p>
           <a:p>
             <a:pPr lvl="3"/>
             <a:r>
-              <a:rPr lang="ko-KR" altLang="en-US" smtClean="0"/>
+              <a:rPr lang="ko-KR" altLang="en-US"/>
               <a:t>넷째 수준</a:t>
             </a:r>
           </a:p>
           <a:p>
             <a:pPr lvl="4"/>
             <a:r>
-              <a:rPr lang="ko-KR" altLang="en-US" smtClean="0"/>
+              <a:rPr lang="ko-KR" altLang="en-US"/>
               <a:t>다섯째 수준</a:t>
             </a:r>
-            <a:endParaRPr lang="ko-KR" altLang="en-US"/>
           </a:p>
         </p:txBody>
       </p:sp>
@@ -629,7 +639,7 @@
           <a:p>
             <a:fld id="{FB30EDBD-1C2D-4C1E-B459-B60219FAB484}" type="datetimeFigureOut">
               <a:rPr lang="ko-KR" altLang="en-US" smtClean="0"/>
-              <a:t>2020-11-09</a:t>
+              <a:t>2021-03-27</a:t>
             </a:fld>
             <a:endParaRPr lang="ko-KR" altLang="en-US"/>
           </a:p>
@@ -718,10 +728,9 @@
           <a:lstStyle/>
           <a:p>
             <a:r>
-              <a:rPr lang="ko-KR" altLang="en-US" smtClean="0"/>
+              <a:rPr lang="ko-KR" altLang="en-US"/>
               <a:t>마스터 제목 스타일 편집</a:t>
             </a:r>
-            <a:endParaRPr lang="ko-KR" altLang="en-US"/>
           </a:p>
         </p:txBody>
       </p:sp>
@@ -742,38 +751,37 @@
           <a:p>
             <a:pPr lvl="0"/>
             <a:r>
-              <a:rPr lang="ko-KR" altLang="en-US" smtClean="0"/>
+              <a:rPr lang="ko-KR" altLang="en-US"/>
               <a:t>마스터 텍스트 스타일을 편집합니다</a:t>
             </a:r>
           </a:p>
           <a:p>
             <a:pPr lvl="1"/>
             <a:r>
-              <a:rPr lang="ko-KR" altLang="en-US" smtClean="0"/>
+              <a:rPr lang="ko-KR" altLang="en-US"/>
               <a:t>둘째 수준</a:t>
             </a:r>
           </a:p>
           <a:p>
             <a:pPr lvl="2"/>
             <a:r>
-              <a:rPr lang="ko-KR" altLang="en-US" smtClean="0"/>
+              <a:rPr lang="ko-KR" altLang="en-US"/>
               <a:t>셋째 수준</a:t>
             </a:r>
           </a:p>
           <a:p>
             <a:pPr lvl="3"/>
             <a:r>
-              <a:rPr lang="ko-KR" altLang="en-US" smtClean="0"/>
+              <a:rPr lang="ko-KR" altLang="en-US"/>
               <a:t>넷째 수준</a:t>
             </a:r>
           </a:p>
           <a:p>
             <a:pPr lvl="4"/>
             <a:r>
-              <a:rPr lang="ko-KR" altLang="en-US" smtClean="0"/>
+              <a:rPr lang="ko-KR" altLang="en-US"/>
               <a:t>다섯째 수준</a:t>
             </a:r>
-            <a:endParaRPr lang="ko-KR" altLang="en-US"/>
           </a:p>
         </p:txBody>
       </p:sp>
@@ -794,7 +802,7 @@
           <a:p>
             <a:fld id="{FB30EDBD-1C2D-4C1E-B459-B60219FAB484}" type="datetimeFigureOut">
               <a:rPr lang="ko-KR" altLang="en-US" smtClean="0"/>
-              <a:t>2020-11-09</a:t>
+              <a:t>2021-03-27</a:t>
             </a:fld>
             <a:endParaRPr lang="ko-KR" altLang="en-US"/>
           </a:p>
@@ -892,10 +900,9 @@
           </a:lstStyle>
           <a:p>
             <a:r>
-              <a:rPr lang="ko-KR" altLang="en-US" smtClean="0"/>
+              <a:rPr lang="ko-KR" altLang="en-US"/>
               <a:t>마스터 제목 스타일 편집</a:t>
             </a:r>
-            <a:endParaRPr lang="ko-KR" altLang="en-US"/>
           </a:p>
         </p:txBody>
       </p:sp>
@@ -1012,7 +1019,7 @@
           <a:p>
             <a:pPr lvl="0"/>
             <a:r>
-              <a:rPr lang="ko-KR" altLang="en-US" smtClean="0"/>
+              <a:rPr lang="ko-KR" altLang="en-US"/>
               <a:t>마스터 텍스트 스타일을 편집합니다</a:t>
             </a:r>
           </a:p>
@@ -1035,7 +1042,7 @@
           <a:p>
             <a:fld id="{FB30EDBD-1C2D-4C1E-B459-B60219FAB484}" type="datetimeFigureOut">
               <a:rPr lang="ko-KR" altLang="en-US" smtClean="0"/>
-              <a:t>2020-11-09</a:t>
+              <a:t>2021-03-27</a:t>
             </a:fld>
             <a:endParaRPr lang="ko-KR" altLang="en-US"/>
           </a:p>
@@ -1124,10 +1131,9 @@
           <a:lstStyle/>
           <a:p>
             <a:r>
-              <a:rPr lang="ko-KR" altLang="en-US" smtClean="0"/>
+              <a:rPr lang="ko-KR" altLang="en-US"/>
               <a:t>마스터 제목 스타일 편집</a:t>
             </a:r>
-            <a:endParaRPr lang="ko-KR" altLang="en-US"/>
           </a:p>
         </p:txBody>
       </p:sp>
@@ -1181,38 +1187,37 @@
           <a:p>
             <a:pPr lvl="0"/>
             <a:r>
-              <a:rPr lang="ko-KR" altLang="en-US" smtClean="0"/>
+              <a:rPr lang="ko-KR" altLang="en-US"/>
               <a:t>마스터 텍스트 스타일을 편집합니다</a:t>
             </a:r>
           </a:p>
           <a:p>
             <a:pPr lvl="1"/>
             <a:r>
-              <a:rPr lang="ko-KR" altLang="en-US" smtClean="0"/>
+              <a:rPr lang="ko-KR" altLang="en-US"/>
               <a:t>둘째 수준</a:t>
             </a:r>
           </a:p>
           <a:p>
             <a:pPr lvl="2"/>
             <a:r>
-              <a:rPr lang="ko-KR" altLang="en-US" smtClean="0"/>
+              <a:rPr lang="ko-KR" altLang="en-US"/>
               <a:t>셋째 수준</a:t>
             </a:r>
           </a:p>
           <a:p>
             <a:pPr lvl="3"/>
             <a:r>
-              <a:rPr lang="ko-KR" altLang="en-US" smtClean="0"/>
+              <a:rPr lang="ko-KR" altLang="en-US"/>
               <a:t>넷째 수준</a:t>
             </a:r>
           </a:p>
           <a:p>
             <a:pPr lvl="4"/>
             <a:r>
-              <a:rPr lang="ko-KR" altLang="en-US" smtClean="0"/>
+              <a:rPr lang="ko-KR" altLang="en-US"/>
               <a:t>다섯째 수준</a:t>
             </a:r>
-            <a:endParaRPr lang="ko-KR" altLang="en-US"/>
           </a:p>
         </p:txBody>
       </p:sp>
@@ -1266,38 +1271,37 @@
           <a:p>
             <a:pPr lvl="0"/>
             <a:r>
-              <a:rPr lang="ko-KR" altLang="en-US" smtClean="0"/>
+              <a:rPr lang="ko-KR" altLang="en-US"/>
               <a:t>마스터 텍스트 스타일을 편집합니다</a:t>
             </a:r>
           </a:p>
           <a:p>
             <a:pPr lvl="1"/>
             <a:r>
-              <a:rPr lang="ko-KR" altLang="en-US" smtClean="0"/>
+              <a:rPr lang="ko-KR" altLang="en-US"/>
               <a:t>둘째 수준</a:t>
             </a:r>
           </a:p>
           <a:p>
             <a:pPr lvl="2"/>
             <a:r>
-              <a:rPr lang="ko-KR" altLang="en-US" smtClean="0"/>
+              <a:rPr lang="ko-KR" altLang="en-US"/>
               <a:t>셋째 수준</a:t>
             </a:r>
           </a:p>
           <a:p>
             <a:pPr lvl="3"/>
             <a:r>
-              <a:rPr lang="ko-KR" altLang="en-US" smtClean="0"/>
+              <a:rPr lang="ko-KR" altLang="en-US"/>
               <a:t>넷째 수준</a:t>
             </a:r>
           </a:p>
           <a:p>
             <a:pPr lvl="4"/>
             <a:r>
-              <a:rPr lang="ko-KR" altLang="en-US" smtClean="0"/>
+              <a:rPr lang="ko-KR" altLang="en-US"/>
               <a:t>다섯째 수준</a:t>
             </a:r>
-            <a:endParaRPr lang="ko-KR" altLang="en-US"/>
           </a:p>
         </p:txBody>
       </p:sp>
@@ -1318,7 +1322,7 @@
           <a:p>
             <a:fld id="{FB30EDBD-1C2D-4C1E-B459-B60219FAB484}" type="datetimeFigureOut">
               <a:rPr lang="ko-KR" altLang="en-US" smtClean="0"/>
-              <a:t>2020-11-09</a:t>
+              <a:t>2021-03-27</a:t>
             </a:fld>
             <a:endParaRPr lang="ko-KR" altLang="en-US"/>
           </a:p>
@@ -1411,10 +1415,9 @@
           </a:lstStyle>
           <a:p>
             <a:r>
-              <a:rPr lang="ko-KR" altLang="en-US" smtClean="0"/>
+              <a:rPr lang="ko-KR" altLang="en-US"/>
               <a:t>마스터 제목 스타일 편집</a:t>
             </a:r>
-            <a:endParaRPr lang="ko-KR" altLang="en-US"/>
           </a:p>
         </p:txBody>
       </p:sp>
@@ -1477,7 +1480,7 @@
           <a:p>
             <a:pPr lvl="0"/>
             <a:r>
-              <a:rPr lang="ko-KR" altLang="en-US" smtClean="0"/>
+              <a:rPr lang="ko-KR" altLang="en-US"/>
               <a:t>마스터 텍스트 스타일을 편집합니다</a:t>
             </a:r>
           </a:p>
@@ -1533,38 +1536,37 @@
           <a:p>
             <a:pPr lvl="0"/>
             <a:r>
-              <a:rPr lang="ko-KR" altLang="en-US" smtClean="0"/>
+              <a:rPr lang="ko-KR" altLang="en-US"/>
               <a:t>마스터 텍스트 스타일을 편집합니다</a:t>
             </a:r>
           </a:p>
           <a:p>
             <a:pPr lvl="1"/>
             <a:r>
-              <a:rPr lang="ko-KR" altLang="en-US" smtClean="0"/>
+              <a:rPr lang="ko-KR" altLang="en-US"/>
               <a:t>둘째 수준</a:t>
             </a:r>
           </a:p>
           <a:p>
             <a:pPr lvl="2"/>
             <a:r>
-              <a:rPr lang="ko-KR" altLang="en-US" smtClean="0"/>
+              <a:rPr lang="ko-KR" altLang="en-US"/>
               <a:t>셋째 수준</a:t>
             </a:r>
           </a:p>
           <a:p>
             <a:pPr lvl="3"/>
             <a:r>
-              <a:rPr lang="ko-KR" altLang="en-US" smtClean="0"/>
+              <a:rPr lang="ko-KR" altLang="en-US"/>
               <a:t>넷째 수준</a:t>
             </a:r>
           </a:p>
           <a:p>
             <a:pPr lvl="4"/>
             <a:r>
-              <a:rPr lang="ko-KR" altLang="en-US" smtClean="0"/>
+              <a:rPr lang="ko-KR" altLang="en-US"/>
               <a:t>다섯째 수준</a:t>
             </a:r>
-            <a:endParaRPr lang="ko-KR" altLang="en-US"/>
           </a:p>
         </p:txBody>
       </p:sp>
@@ -1627,7 +1629,7 @@
           <a:p>
             <a:pPr lvl="0"/>
             <a:r>
-              <a:rPr lang="ko-KR" altLang="en-US" smtClean="0"/>
+              <a:rPr lang="ko-KR" altLang="en-US"/>
               <a:t>마스터 텍스트 스타일을 편집합니다</a:t>
             </a:r>
           </a:p>
@@ -1683,38 +1685,37 @@
           <a:p>
             <a:pPr lvl="0"/>
             <a:r>
-              <a:rPr lang="ko-KR" altLang="en-US" smtClean="0"/>
+              <a:rPr lang="ko-KR" altLang="en-US"/>
               <a:t>마스터 텍스트 스타일을 편집합니다</a:t>
             </a:r>
           </a:p>
           <a:p>
             <a:pPr lvl="1"/>
             <a:r>
-              <a:rPr lang="ko-KR" altLang="en-US" smtClean="0"/>
+              <a:rPr lang="ko-KR" altLang="en-US"/>
               <a:t>둘째 수준</a:t>
             </a:r>
           </a:p>
           <a:p>
             <a:pPr lvl="2"/>
             <a:r>
-              <a:rPr lang="ko-KR" altLang="en-US" smtClean="0"/>
+              <a:rPr lang="ko-KR" altLang="en-US"/>
               <a:t>셋째 수준</a:t>
             </a:r>
           </a:p>
           <a:p>
             <a:pPr lvl="3"/>
             <a:r>
-              <a:rPr lang="ko-KR" altLang="en-US" smtClean="0"/>
+              <a:rPr lang="ko-KR" altLang="en-US"/>
               <a:t>넷째 수준</a:t>
             </a:r>
           </a:p>
           <a:p>
             <a:pPr lvl="4"/>
             <a:r>
-              <a:rPr lang="ko-KR" altLang="en-US" smtClean="0"/>
+              <a:rPr lang="ko-KR" altLang="en-US"/>
               <a:t>다섯째 수준</a:t>
             </a:r>
-            <a:endParaRPr lang="ko-KR" altLang="en-US"/>
           </a:p>
         </p:txBody>
       </p:sp>
@@ -1735,7 +1736,7 @@
           <a:p>
             <a:fld id="{FB30EDBD-1C2D-4C1E-B459-B60219FAB484}" type="datetimeFigureOut">
               <a:rPr lang="ko-KR" altLang="en-US" smtClean="0"/>
-              <a:t>2020-11-09</a:t>
+              <a:t>2021-03-27</a:t>
             </a:fld>
             <a:endParaRPr lang="ko-KR" altLang="en-US"/>
           </a:p>
@@ -1824,10 +1825,9 @@
           <a:lstStyle/>
           <a:p>
             <a:r>
-              <a:rPr lang="ko-KR" altLang="en-US" smtClean="0"/>
+              <a:rPr lang="ko-KR" altLang="en-US"/>
               <a:t>마스터 제목 스타일 편집</a:t>
             </a:r>
-            <a:endParaRPr lang="ko-KR" altLang="en-US"/>
           </a:p>
         </p:txBody>
       </p:sp>
@@ -1848,7 +1848,7 @@
           <a:p>
             <a:fld id="{FB30EDBD-1C2D-4C1E-B459-B60219FAB484}" type="datetimeFigureOut">
               <a:rPr lang="ko-KR" altLang="en-US" smtClean="0"/>
-              <a:t>2020-11-09</a:t>
+              <a:t>2021-03-27</a:t>
             </a:fld>
             <a:endParaRPr lang="ko-KR" altLang="en-US"/>
           </a:p>
@@ -1938,7 +1938,7 @@
           <a:p>
             <a:fld id="{FB30EDBD-1C2D-4C1E-B459-B60219FAB484}" type="datetimeFigureOut">
               <a:rPr lang="ko-KR" altLang="en-US" smtClean="0"/>
-              <a:t>2020-11-09</a:t>
+              <a:t>2021-03-27</a:t>
             </a:fld>
             <a:endParaRPr lang="ko-KR" altLang="en-US"/>
           </a:p>
@@ -2036,10 +2036,9 @@
           </a:lstStyle>
           <a:p>
             <a:r>
-              <a:rPr lang="ko-KR" altLang="en-US" smtClean="0"/>
+              <a:rPr lang="ko-KR" altLang="en-US"/>
               <a:t>마스터 제목 스타일 편집</a:t>
             </a:r>
-            <a:endParaRPr lang="ko-KR" altLang="en-US"/>
           </a:p>
         </p:txBody>
       </p:sp>
@@ -2093,38 +2092,37 @@
           <a:p>
             <a:pPr lvl="0"/>
             <a:r>
-              <a:rPr lang="ko-KR" altLang="en-US" smtClean="0"/>
+              <a:rPr lang="ko-KR" altLang="en-US"/>
               <a:t>마스터 텍스트 스타일을 편집합니다</a:t>
             </a:r>
           </a:p>
           <a:p>
             <a:pPr lvl="1"/>
             <a:r>
-              <a:rPr lang="ko-KR" altLang="en-US" smtClean="0"/>
+              <a:rPr lang="ko-KR" altLang="en-US"/>
               <a:t>둘째 수준</a:t>
             </a:r>
           </a:p>
           <a:p>
             <a:pPr lvl="2"/>
             <a:r>
-              <a:rPr lang="ko-KR" altLang="en-US" smtClean="0"/>
+              <a:rPr lang="ko-KR" altLang="en-US"/>
               <a:t>셋째 수준</a:t>
             </a:r>
           </a:p>
           <a:p>
             <a:pPr lvl="3"/>
             <a:r>
-              <a:rPr lang="ko-KR" altLang="en-US" smtClean="0"/>
+              <a:rPr lang="ko-KR" altLang="en-US"/>
               <a:t>넷째 수준</a:t>
             </a:r>
           </a:p>
           <a:p>
             <a:pPr lvl="4"/>
             <a:r>
-              <a:rPr lang="ko-KR" altLang="en-US" smtClean="0"/>
+              <a:rPr lang="ko-KR" altLang="en-US"/>
               <a:t>다섯째 수준</a:t>
             </a:r>
-            <a:endParaRPr lang="ko-KR" altLang="en-US"/>
           </a:p>
         </p:txBody>
       </p:sp>
@@ -2187,7 +2185,7 @@
           <a:p>
             <a:pPr lvl="0"/>
             <a:r>
-              <a:rPr lang="ko-KR" altLang="en-US" smtClean="0"/>
+              <a:rPr lang="ko-KR" altLang="en-US"/>
               <a:t>마스터 텍스트 스타일을 편집합니다</a:t>
             </a:r>
           </a:p>
@@ -2210,7 +2208,7 @@
           <a:p>
             <a:fld id="{FB30EDBD-1C2D-4C1E-B459-B60219FAB484}" type="datetimeFigureOut">
               <a:rPr lang="ko-KR" altLang="en-US" smtClean="0"/>
-              <a:t>2020-11-09</a:t>
+              <a:t>2021-03-27</a:t>
             </a:fld>
             <a:endParaRPr lang="ko-KR" altLang="en-US"/>
           </a:p>
@@ -2308,10 +2306,9 @@
           </a:lstStyle>
           <a:p>
             <a:r>
-              <a:rPr lang="ko-KR" altLang="en-US" smtClean="0"/>
+              <a:rPr lang="ko-KR" altLang="en-US"/>
               <a:t>마스터 제목 스타일 편집</a:t>
             </a:r>
-            <a:endParaRPr lang="ko-KR" altLang="en-US"/>
           </a:p>
         </p:txBody>
       </p:sp>
@@ -2435,7 +2432,7 @@
           <a:p>
             <a:pPr lvl="0"/>
             <a:r>
-              <a:rPr lang="ko-KR" altLang="en-US" smtClean="0"/>
+              <a:rPr lang="ko-KR" altLang="en-US"/>
               <a:t>마스터 텍스트 스타일을 편집합니다</a:t>
             </a:r>
           </a:p>
@@ -2458,7 +2455,7 @@
           <a:p>
             <a:fld id="{FB30EDBD-1C2D-4C1E-B459-B60219FAB484}" type="datetimeFigureOut">
               <a:rPr lang="ko-KR" altLang="en-US" smtClean="0"/>
-              <a:t>2020-11-09</a:t>
+              <a:t>2021-03-27</a:t>
             </a:fld>
             <a:endParaRPr lang="ko-KR" altLang="en-US"/>
           </a:p>
@@ -2562,10 +2559,9 @@
           <a:lstStyle/>
           <a:p>
             <a:r>
-              <a:rPr lang="ko-KR" altLang="en-US" smtClean="0"/>
+              <a:rPr lang="ko-KR" altLang="en-US"/>
               <a:t>마스터 제목 스타일 편집</a:t>
             </a:r>
-            <a:endParaRPr lang="ko-KR" altLang="en-US"/>
           </a:p>
         </p:txBody>
       </p:sp>
@@ -2596,38 +2592,37 @@
           <a:p>
             <a:pPr lvl="0"/>
             <a:r>
-              <a:rPr lang="ko-KR" altLang="en-US" smtClean="0"/>
+              <a:rPr lang="ko-KR" altLang="en-US"/>
               <a:t>마스터 텍스트 스타일을 편집합니다</a:t>
             </a:r>
           </a:p>
           <a:p>
             <a:pPr lvl="1"/>
             <a:r>
-              <a:rPr lang="ko-KR" altLang="en-US" smtClean="0"/>
+              <a:rPr lang="ko-KR" altLang="en-US"/>
               <a:t>둘째 수준</a:t>
             </a:r>
           </a:p>
           <a:p>
             <a:pPr lvl="2"/>
             <a:r>
-              <a:rPr lang="ko-KR" altLang="en-US" smtClean="0"/>
+              <a:rPr lang="ko-KR" altLang="en-US"/>
               <a:t>셋째 수준</a:t>
             </a:r>
           </a:p>
           <a:p>
             <a:pPr lvl="3"/>
             <a:r>
-              <a:rPr lang="ko-KR" altLang="en-US" smtClean="0"/>
+              <a:rPr lang="ko-KR" altLang="en-US"/>
               <a:t>넷째 수준</a:t>
             </a:r>
           </a:p>
           <a:p>
             <a:pPr lvl="4"/>
             <a:r>
-              <a:rPr lang="ko-KR" altLang="en-US" smtClean="0"/>
+              <a:rPr lang="ko-KR" altLang="en-US"/>
               <a:t>다섯째 수준</a:t>
             </a:r>
-            <a:endParaRPr lang="ko-KR" altLang="en-US"/>
           </a:p>
         </p:txBody>
       </p:sp>
@@ -2666,7 +2661,7 @@
           <a:p>
             <a:fld id="{FB30EDBD-1C2D-4C1E-B459-B60219FAB484}" type="datetimeFigureOut">
               <a:rPr lang="ko-KR" altLang="en-US" smtClean="0"/>
-              <a:t>2020-11-09</a:t>
+              <a:t>2021-03-27</a:t>
             </a:fld>
             <a:endParaRPr lang="ko-KR" altLang="en-US"/>
           </a:p>
@@ -3132,66 +3127,32 @@
       </p:grpSpPr>
       <p:pic>
         <p:nvPicPr>
-          <p:cNvPr id="2050" name="Picture 2"/>
+          <p:cNvPr id="3" name="그림 2">
+            <a:extLst>
+              <a:ext uri="{FF2B5EF4-FFF2-40B4-BE49-F238E27FC236}">
+                <a16:creationId xmlns:a16="http://schemas.microsoft.com/office/drawing/2014/main" id="{88284353-D852-4AE8-B7F8-F53350900655}"/>
+              </a:ext>
+            </a:extLst>
+          </p:cNvPr>
           <p:cNvPicPr>
-            <a:picLocks noChangeAspect="1" noChangeArrowheads="1"/>
+            <a:picLocks noChangeAspect="1"/>
           </p:cNvPicPr>
           <p:nvPr/>
         </p:nvPicPr>
         <p:blipFill>
-          <a:blip r:embed="rId2">
-            <a:extLst>
-              <a:ext uri="{28A0092B-C50C-407E-A947-70E740481C1C}">
-                <a14:useLocalDpi xmlns:a14="http://schemas.microsoft.com/office/drawing/2010/main" val="0"/>
-              </a:ext>
-            </a:extLst>
-          </a:blip>
-          <a:srcRect/>
+          <a:blip r:embed="rId2"/>
           <a:stretch>
             <a:fillRect/>
           </a:stretch>
         </p:blipFill>
-        <p:spPr bwMode="auto">
+        <p:spPr>
           <a:xfrm>
-            <a:off x="1909763" y="1433513"/>
-            <a:ext cx="5324475" cy="3990975"/>
+            <a:off x="1907704" y="1300708"/>
+            <a:ext cx="5334000" cy="4000500"/>
           </a:xfrm>
           <a:prstGeom prst="rect">
             <a:avLst/>
           </a:prstGeom>
-          <a:noFill/>
-          <a:ln>
-            <a:noFill/>
-          </a:ln>
-          <a:effectLst/>
-          <a:extLst>
-            <a:ext uri="{909E8E84-426E-40DD-AFC4-6F175D3DCCD1}">
-              <a14:hiddenFill xmlns:a14="http://schemas.microsoft.com/office/drawing/2010/main">
-                <a:solidFill>
-                  <a:schemeClr val="accent1"/>
-                </a:solidFill>
-              </a14:hiddenFill>
-            </a:ext>
-            <a:ext uri="{91240B29-F687-4F45-9708-019B960494DF}">
-              <a14:hiddenLine xmlns:a14="http://schemas.microsoft.com/office/drawing/2010/main" w="9525">
-                <a:solidFill>
-                  <a:schemeClr val="tx1"/>
-                </a:solidFill>
-                <a:miter lim="800000"/>
-                <a:headEnd/>
-                <a:tailEnd/>
-              </a14:hiddenLine>
-            </a:ext>
-            <a:ext uri="{AF507438-7753-43E0-B8FC-AC1667EBCBE1}">
-              <a14:hiddenEffects xmlns:a14="http://schemas.microsoft.com/office/drawing/2010/main">
-                <a:effectLst>
-                  <a:outerShdw dist="35921" dir="2700000" algn="ctr" rotWithShape="0">
-                    <a:schemeClr val="bg2"/>
-                  </a:outerShdw>
-                </a:effectLst>
-              </a14:hiddenEffects>
-            </a:ext>
-          </a:extLst>
         </p:spPr>
       </p:pic>
       <p:sp>
@@ -3202,7 +3163,7 @@
         </p:nvSpPr>
         <p:spPr>
           <a:xfrm>
-            <a:off x="2645036" y="2276872"/>
+            <a:off x="2699792" y="2492896"/>
             <a:ext cx="712054" cy="369332"/>
           </a:xfrm>
           <a:prstGeom prst="rect">
@@ -3217,7 +3178,7 @@
           <a:lstStyle/>
           <a:p>
             <a:r>
-              <a:rPr lang="en-US" altLang="ko-KR" dirty="0" smtClean="0"/>
+              <a:rPr lang="en-US" altLang="ko-KR" dirty="0"/>
               <a:t>50Hz</a:t>
             </a:r>
             <a:endParaRPr lang="ko-KR" altLang="en-US" dirty="0"/>
@@ -3232,7 +3193,7 @@
         </p:nvSpPr>
         <p:spPr>
           <a:xfrm>
-            <a:off x="3635896" y="2204864"/>
+            <a:off x="3203848" y="1712136"/>
             <a:ext cx="838691" cy="369332"/>
           </a:xfrm>
           <a:prstGeom prst="rect">
@@ -3247,7 +3208,7 @@
           <a:lstStyle/>
           <a:p>
             <a:r>
-              <a:rPr lang="en-US" altLang="ko-KR" dirty="0" smtClean="0"/>
+              <a:rPr lang="en-US" altLang="ko-KR" dirty="0"/>
               <a:t>120Hz</a:t>
             </a:r>
             <a:endParaRPr lang="ko-KR" altLang="en-US" dirty="0"/>

</xml_diff>